<commit_message>
20171127 updates - font status menu
</commit_message>
<xml_diff>
--- a/2013180006JaeHwanKim_2DGameProgramming_2nd-Announcement.pptx
+++ b/2013180006JaeHwanKim_2DGameProgramming_2nd-Announcement.pptx
@@ -756,31 +756,7 @@
                 <a:latin typeface="SpoqaHanSans" panose="020B0500000000000000" pitchFamily="50" charset="-127"/>
                 <a:ea typeface="SpoqaHanSans" panose="020B0500000000000000" pitchFamily="50" charset="-127"/>
               </a:rPr>
-              <a:t>차 </a:t>
-            </a:r>
-            <a:r>
-              <a:rPr lang="ko-KR" altLang="en-US" sz="4000" dirty="0" smtClean="0">
-                <a:gradFill>
-                  <a:gsLst>
-                    <a:gs pos="0">
-                      <a:schemeClr val="tx1">
-                        <a:lumMod val="65000"/>
-                        <a:lumOff val="35000"/>
-                      </a:schemeClr>
-                    </a:gs>
-                    <a:gs pos="100000">
-                      <a:schemeClr val="tx1">
-                        <a:lumMod val="65000"/>
-                        <a:lumOff val="35000"/>
-                      </a:schemeClr>
-                    </a:gs>
-                  </a:gsLst>
-                  <a:lin ang="5400000" scaled="1"/>
-                </a:gradFill>
-                <a:latin typeface="SpoqaHanSans" panose="020B0500000000000000" pitchFamily="50" charset="-127"/>
-                <a:ea typeface="SpoqaHanSans" panose="020B0500000000000000" pitchFamily="50" charset="-127"/>
-              </a:rPr>
-              <a:t>발표</a:t>
+              <a:t>차 발표</a:t>
             </a:r>
             <a:endParaRPr lang="ko-KR" altLang="en-US" sz="4000" dirty="0">
               <a:gradFill>
@@ -2820,25 +2796,7 @@
                 <a:latin typeface="SpoqaHanSans" panose="020B0500000000000000" pitchFamily="50" charset="-127"/>
                 <a:ea typeface="SpoqaHanSans" panose="020B0500000000000000" pitchFamily="50" charset="-127"/>
               </a:rPr>
-              <a:t>개발 </a:t>
-            </a:r>
-            <a:r>
-              <a:rPr lang="ko-KR" altLang="en-US" sz="3600" b="1" dirty="0" smtClean="0">
-                <a:gradFill>
-                  <a:gsLst>
-                    <a:gs pos="0">
-                      <a:srgbClr val="336E7B"/>
-                    </a:gs>
-                    <a:gs pos="100000">
-                      <a:srgbClr val="336E7B"/>
-                    </a:gs>
-                  </a:gsLst>
-                  <a:lin ang="5400000" scaled="1"/>
-                </a:gradFill>
-                <a:latin typeface="SpoqaHanSans" panose="020B0500000000000000" pitchFamily="50" charset="-127"/>
-                <a:ea typeface="SpoqaHanSans" panose="020B0500000000000000" pitchFamily="50" charset="-127"/>
-              </a:rPr>
-              <a:t>계획 대비 현재 진행 상황</a:t>
+              <a:t>개발 계획 대비 현재 진행 상황</a:t>
             </a:r>
             <a:endParaRPr lang="en-US" altLang="ko-KR" sz="3600" b="1" dirty="0" smtClean="0">
               <a:gradFill>
@@ -2937,7 +2895,7 @@
           <p:nvPr>
             <p:extLst>
               <p:ext uri="{D42A27DB-BD31-4B8C-83A1-F6EECF244321}">
-                <p14:modId xmlns:p14="http://schemas.microsoft.com/office/powerpoint/2010/main" val="1411143122"/>
+                <p14:modId xmlns:p14="http://schemas.microsoft.com/office/powerpoint/2010/main" val="2904778511"/>
               </p:ext>
             </p:extLst>
           </p:nvPr>
@@ -3540,23 +3498,19 @@
                       </a:r>
                       <a:r>
                         <a:rPr lang="ko-KR" altLang="en-US" sz="1400" baseline="0" dirty="0" smtClean="0"/>
-                        <a:t>캐릭터 컨트롤러 </a:t>
+                        <a:t>캐릭터 </a:t>
                       </a:r>
                       <a:r>
                         <a:rPr lang="en-US" altLang="ko-KR" sz="1400" baseline="0" dirty="0" smtClean="0"/>
-                        <a:t>(</a:t>
+                        <a:t>8</a:t>
                       </a:r>
                       <a:r>
                         <a:rPr lang="ko-KR" altLang="en-US" sz="1400" baseline="0" dirty="0" smtClean="0"/>
-                        <a:t>추가 구현의 대각선 이동 포함</a:t>
-                      </a:r>
-                      <a:r>
-                        <a:rPr lang="en-US" altLang="ko-KR" sz="1400" baseline="0" dirty="0" smtClean="0"/>
-                        <a:t>) </a:t>
+                        <a:t>방향 이동과 기본 근접 공격 구현 </a:t>
                       </a:r>
                       <a:r>
                         <a:rPr lang="ko-KR" altLang="en-US" sz="1400" baseline="0" dirty="0" smtClean="0"/>
-                        <a:t>구현 완료</a:t>
+                        <a:t>완료</a:t>
                       </a:r>
                       <a:r>
                         <a:rPr lang="en-US" altLang="ko-KR" sz="1400" baseline="0" dirty="0" smtClean="0"/>
@@ -3764,7 +3718,11 @@
                       <a:pPr latinLnBrk="1"/>
                       <a:r>
                         <a:rPr lang="en-US" altLang="ko-KR" sz="1400" b="0" dirty="0" smtClean="0"/>
-                        <a:t>(10%) </a:t>
+                        <a:t>(40</a:t>
+                      </a:r>
+                      <a:r>
+                        <a:rPr lang="en-US" altLang="ko-KR" sz="1400" b="0" dirty="0" smtClean="0"/>
+                        <a:t>%) </a:t>
                       </a:r>
                       <a:r>
                         <a:rPr lang="ko-KR" altLang="en-US" sz="1400" b="0" dirty="0" smtClean="0"/>
@@ -3776,7 +3734,15 @@
                       </a:r>
                       <a:r>
                         <a:rPr lang="ko-KR" altLang="en-US" sz="1400" b="0" dirty="0" smtClean="0"/>
-                        <a:t>몬스터의 </a:t>
+                        <a:t>몬스터</a:t>
+                      </a:r>
+                      <a:r>
+                        <a:rPr lang="ko-KR" altLang="en-US" sz="1400" b="0" baseline="0" dirty="0" smtClean="0"/>
+                        <a:t> 클래스를 포함한</a:t>
+                      </a:r>
+                      <a:r>
+                        <a:rPr lang="en-US" altLang="ko-KR" sz="1400" b="0" baseline="0" dirty="0" smtClean="0"/>
+                        <a:t> </a:t>
                       </a:r>
                       <a:r>
                         <a:rPr lang="en-US" altLang="ko-KR" sz="1400" b="0" dirty="0" smtClean="0"/>
@@ -3784,11 +3750,7 @@
                       </a:r>
                       <a:r>
                         <a:rPr lang="ko-KR" altLang="en-US" sz="1400" b="0" dirty="0" smtClean="0"/>
-                        <a:t>구현 완</a:t>
-                      </a:r>
-                      <a:r>
-                        <a:rPr lang="ko-KR" altLang="en-US" sz="1400" b="0" dirty="0" smtClean="0"/>
-                        <a:t>료</a:t>
+                        <a:t>구현 완료</a:t>
                       </a:r>
                       <a:endParaRPr lang="ko-KR" altLang="en-US" sz="1400" b="0" dirty="0"/>
                     </a:p>
@@ -3960,11 +3922,39 @@
                       <a:pPr latinLnBrk="1"/>
                       <a:r>
                         <a:rPr lang="en-US" altLang="ko-KR" sz="1400" dirty="0" smtClean="0"/>
-                        <a:t>(10%) </a:t>
+                        <a:t>(75%) </a:t>
                       </a:r>
                       <a:r>
                         <a:rPr lang="ko-KR" altLang="en-US" sz="1400" dirty="0" smtClean="0"/>
-                        <a:t>육성 구현 완료</a:t>
+                        <a:t>육성 </a:t>
+                      </a:r>
+                      <a:r>
+                        <a:rPr lang="ko-KR" altLang="en-US" sz="1400" dirty="0" smtClean="0"/>
+                        <a:t>구현</a:t>
+                      </a:r>
+                      <a:r>
+                        <a:rPr lang="en-US" altLang="ko-KR" sz="1400" dirty="0" smtClean="0"/>
+                        <a:t>,</a:t>
+                      </a:r>
+                      <a:r>
+                        <a:rPr lang="ko-KR" altLang="en-US" sz="1400" dirty="0" smtClean="0"/>
+                        <a:t> 소모 아이템 </a:t>
+                      </a:r>
+                      <a:r>
+                        <a:rPr lang="en-US" altLang="ko-KR" sz="1400" dirty="0" smtClean="0"/>
+                        <a:t>(HP </a:t>
+                      </a:r>
+                      <a:r>
+                        <a:rPr lang="ko-KR" altLang="en-US" sz="1400" dirty="0" smtClean="0"/>
+                        <a:t>회복</a:t>
+                      </a:r>
+                      <a:r>
+                        <a:rPr lang="en-US" altLang="ko-KR" sz="1400" dirty="0" smtClean="0"/>
+                        <a:t>) </a:t>
+                      </a:r>
+                      <a:r>
+                        <a:rPr lang="ko-KR" altLang="en-US" sz="1400" dirty="0" smtClean="0"/>
+                        <a:t>완료</a:t>
                       </a:r>
                       <a:endParaRPr lang="ko-KR" altLang="en-US" sz="1400" dirty="0"/>
                     </a:p>
@@ -9429,21 +9419,6 @@
               </a:rPr>
               <a:t>-hub commits</a:t>
             </a:r>
-            <a:endParaRPr lang="en-US" altLang="ko-KR" sz="4000" dirty="0" smtClean="0">
-              <a:gradFill>
-                <a:gsLst>
-                  <a:gs pos="0">
-                    <a:srgbClr val="336E7B"/>
-                  </a:gs>
-                  <a:gs pos="100000">
-                    <a:srgbClr val="336E7B"/>
-                  </a:gs>
-                </a:gsLst>
-                <a:lin ang="5400000" scaled="1"/>
-              </a:gradFill>
-              <a:latin typeface="SpoqaHanSans" panose="020B0500000000000000" pitchFamily="50" charset="-127"/>
-              <a:ea typeface="SpoqaHanSans" panose="020B0500000000000000" pitchFamily="50" charset="-127"/>
-            </a:endParaRPr>
           </a:p>
         </p:txBody>
       </p:sp>

</xml_diff>